<commit_message>
Update Q1 Trend Analysis presentation
Revised Q1-Trend-analysis.pptx with updated content or formatting. Review changes in the presentation for details.
</commit_message>
<xml_diff>
--- a/Q1-Trend-analysis.pptx
+++ b/Q1-Trend-analysis.pptx
@@ -3175,7 +3175,7 @@
           <a:p>
             <a:fld id="{612A29D0-3503-423A-BBF2-5D50EA30CB1D}" type="datetimeFigureOut">
               <a:rPr lang="en-GB" smtClean="0"/>
-              <a:t>07/07/2025</a:t>
+              <a:t>29/07/2025</a:t>
             </a:fld>
             <a:endParaRPr lang="en-GB"/>
           </a:p>
@@ -3600,7 +3600,7 @@
           <a:p>
             <a:fld id="{8A122F94-0B89-4B50-AD25-407BC35894F4}" type="datetime1">
               <a:rPr lang="en-GB" smtClean="0"/>
-              <a:t>07/07/2025</a:t>
+              <a:t>29/07/2025</a:t>
             </a:fld>
             <a:endParaRPr lang="en-US" dirty="0"/>
           </a:p>
@@ -3798,7 +3798,7 @@
           <a:p>
             <a:fld id="{6D5CAC86-111A-4031-870E-76EF0DAA8508}" type="datetime1">
               <a:rPr lang="en-GB" smtClean="0"/>
-              <a:t>07/07/2025</a:t>
+              <a:t>29/07/2025</a:t>
             </a:fld>
             <a:endParaRPr lang="en-US"/>
           </a:p>
@@ -4006,7 +4006,7 @@
           <a:p>
             <a:fld id="{2FCB7F5C-9520-4D94-9326-50F7F5E32D47}" type="datetime1">
               <a:rPr lang="en-GB" smtClean="0"/>
-              <a:t>07/07/2025</a:t>
+              <a:t>29/07/2025</a:t>
             </a:fld>
             <a:endParaRPr lang="en-US"/>
           </a:p>
@@ -4204,7 +4204,7 @@
           <a:p>
             <a:fld id="{A6FFC6E5-5193-4CAC-9986-53F77D497977}" type="datetime1">
               <a:rPr lang="en-GB" smtClean="0"/>
-              <a:t>07/07/2025</a:t>
+              <a:t>29/07/2025</a:t>
             </a:fld>
             <a:endParaRPr lang="en-US"/>
           </a:p>
@@ -4479,7 +4479,7 @@
           <a:p>
             <a:fld id="{B379E5C1-CE2C-441B-9442-4117E37B0EBF}" type="datetime1">
               <a:rPr lang="en-GB" smtClean="0"/>
-              <a:t>07/07/2025</a:t>
+              <a:t>29/07/2025</a:t>
             </a:fld>
             <a:endParaRPr lang="en-US"/>
           </a:p>
@@ -4744,7 +4744,7 @@
           <a:p>
             <a:fld id="{E65B888D-A90A-498A-A25C-E777357D75EA}" type="datetime1">
               <a:rPr lang="en-GB" smtClean="0"/>
-              <a:t>07/07/2025</a:t>
+              <a:t>29/07/2025</a:t>
             </a:fld>
             <a:endParaRPr lang="en-US"/>
           </a:p>
@@ -5156,7 +5156,7 @@
           <a:p>
             <a:fld id="{31EC52C7-71AE-4FF5-9867-A6FD57E01BB8}" type="datetime1">
               <a:rPr lang="en-GB" smtClean="0"/>
-              <a:t>07/07/2025</a:t>
+              <a:t>29/07/2025</a:t>
             </a:fld>
             <a:endParaRPr lang="en-US"/>
           </a:p>
@@ -5297,7 +5297,7 @@
           <a:p>
             <a:fld id="{B9B545AD-05BE-46FA-94B4-420C9BB633E1}" type="datetime1">
               <a:rPr lang="en-GB" smtClean="0"/>
-              <a:t>07/07/2025</a:t>
+              <a:t>29/07/2025</a:t>
             </a:fld>
             <a:endParaRPr lang="en-US"/>
           </a:p>
@@ -5410,7 +5410,7 @@
           <a:p>
             <a:fld id="{61CD36FC-952F-4604-9DA3-2515CADC3A87}" type="datetime1">
               <a:rPr lang="en-GB" smtClean="0"/>
-              <a:t>07/07/2025</a:t>
+              <a:t>29/07/2025</a:t>
             </a:fld>
             <a:endParaRPr lang="en-US"/>
           </a:p>
@@ -5721,7 +5721,7 @@
           <a:p>
             <a:fld id="{10045D21-69C7-4B34-BA91-EF9CF3B85233}" type="datetime1">
               <a:rPr lang="en-GB" smtClean="0"/>
-              <a:t>07/07/2025</a:t>
+              <a:t>29/07/2025</a:t>
             </a:fld>
             <a:endParaRPr lang="en-US"/>
           </a:p>
@@ -6009,7 +6009,7 @@
           <a:p>
             <a:fld id="{27C76BC3-C7A1-42D8-AC14-056CEDFF964D}" type="datetime1">
               <a:rPr lang="en-GB" smtClean="0"/>
-              <a:t>07/07/2025</a:t>
+              <a:t>29/07/2025</a:t>
             </a:fld>
             <a:endParaRPr lang="en-US"/>
           </a:p>
@@ -6250,7 +6250,7 @@
           <a:p>
             <a:fld id="{AAA9DFE6-D7DA-46C3-8175-16838567457D}" type="datetime1">
               <a:rPr lang="en-GB" smtClean="0"/>
-              <a:t>07/07/2025</a:t>
+              <a:t>29/07/2025</a:t>
             </a:fld>
             <a:endParaRPr lang="en-US" dirty="0"/>
           </a:p>
@@ -6792,19 +6792,28 @@
           </a:xfrm>
         </p:spPr>
         <p:txBody>
-          <a:bodyPr/>
+          <a:bodyPr>
+            <a:normAutofit/>
+          </a:bodyPr>
           <a:lstStyle/>
           <a:p>
             <a:pPr algn="l"/>
-            <a:r>
-              <a:rPr lang="en-GB" b="1" spc="-150" dirty="0">
+            <a:endParaRPr lang="en-GB" sz="2800" b="1" spc="-150" dirty="0">
+              <a:latin typeface="Aptos" panose="020B0004020202020204" pitchFamily="34" charset="0"/>
+              <a:cs typeface="Biome" panose="020B0502040204020203" pitchFamily="34" charset="0"/>
+            </a:endParaRPr>
+          </a:p>
+          <a:p>
+            <a:pPr algn="l"/>
+            <a:r>
+              <a:rPr lang="en-GB" sz="2800" b="1" spc="-150" dirty="0">
                 <a:latin typeface="Aptos" panose="020B0004020202020204" pitchFamily="34" charset="0"/>
                 <a:cs typeface="Biome" panose="020B0502040204020203" pitchFamily="34" charset="0"/>
               </a:rPr>
               <a:t>Presented by: </a:t>
             </a:r>
             <a:r>
-              <a:rPr lang="en-GB" dirty="0">
+              <a:rPr lang="en-GB" sz="2800" dirty="0">
                 <a:latin typeface="Aptos" panose="020B0004020202020204" pitchFamily="34" charset="0"/>
                 <a:cs typeface="Biome" panose="020B0502040204020203" pitchFamily="34" charset="0"/>
               </a:rPr>
@@ -6814,14 +6823,14 @@
           <a:p>
             <a:pPr algn="l"/>
             <a:r>
-              <a:rPr lang="en-GB" b="1" spc="-150" dirty="0">
+              <a:rPr lang="en-GB" sz="2800" b="1" spc="-150" dirty="0">
                 <a:latin typeface="Aptos" panose="020B0004020202020204" pitchFamily="34" charset="0"/>
                 <a:cs typeface="Biome" panose="020B0502040204020203" pitchFamily="34" charset="0"/>
               </a:rPr>
               <a:t>Last Updated: </a:t>
             </a:r>
             <a:r>
-              <a:rPr lang="en-GB" dirty="0">
+              <a:rPr lang="en-GB" sz="2800" dirty="0">
                 <a:latin typeface="Aptos" panose="020B0004020202020204" pitchFamily="34" charset="0"/>
                 <a:cs typeface="Biome" panose="020B0502040204020203" pitchFamily="34" charset="0"/>
               </a:rPr>
@@ -6853,7 +6862,7 @@
           <a:p>
             <a:fld id="{726E7E89-ED24-4243-9B10-49ECC1EC3E9E}" type="datetime1">
               <a:rPr lang="en-GB" smtClean="0"/>
-              <a:t>07/07/2025</a:t>
+              <a:t>29/07/2025</a:t>
             </a:fld>
             <a:endParaRPr lang="en-US" dirty="0"/>
           </a:p>
@@ -7042,7 +7051,7 @@
           <a:p>
             <a:fld id="{6E4BB78C-88A4-432F-8BB5-272D432DED4B}" type="datetime1">
               <a:rPr lang="en-GB" smtClean="0"/>
-              <a:t>07/07/2025</a:t>
+              <a:t>29/07/2025</a:t>
             </a:fld>
             <a:endParaRPr lang="en-US"/>
           </a:p>
@@ -7936,7 +7945,7 @@
           <a:p>
             <a:fld id="{6E4BB78C-88A4-432F-8BB5-272D432DED4B}" type="datetime1">
               <a:rPr lang="en-GB" smtClean="0"/>
-              <a:t>07/07/2025</a:t>
+              <a:t>29/07/2025</a:t>
             </a:fld>
             <a:endParaRPr lang="en-US"/>
           </a:p>
@@ -8114,7 +8123,7 @@
           <a:p>
             <a:fld id="{A6FFC6E5-5193-4CAC-9986-53F77D497977}" type="datetime1">
               <a:rPr lang="en-GB" smtClean="0"/>
-              <a:t>07/07/2025</a:t>
+              <a:t>29/07/2025</a:t>
             </a:fld>
             <a:endParaRPr lang="en-US"/>
           </a:p>
@@ -8462,7 +8471,7 @@
           <a:p>
             <a:fld id="{6E4BB78C-88A4-432F-8BB5-272D432DED4B}" type="datetime1">
               <a:rPr lang="en-GB" smtClean="0"/>
-              <a:t>07/07/2025</a:t>
+              <a:t>29/07/2025</a:t>
             </a:fld>
             <a:endParaRPr lang="en-US"/>
           </a:p>
@@ -8669,7 +8678,7 @@
           <a:p>
             <a:fld id="{6E4BB78C-88A4-432F-8BB5-272D432DED4B}" type="datetime1">
               <a:rPr lang="en-GB" smtClean="0"/>
-              <a:t>07/07/2025</a:t>
+              <a:t>29/07/2025</a:t>
             </a:fld>
             <a:endParaRPr lang="en-US"/>
           </a:p>
@@ -9365,7 +9374,7 @@
           <a:p>
             <a:fld id="{6E4BB78C-88A4-432F-8BB5-272D432DED4B}" type="datetime1">
               <a:rPr lang="en-GB" smtClean="0"/>
-              <a:t>07/07/2025</a:t>
+              <a:t>29/07/2025</a:t>
             </a:fld>
             <a:endParaRPr lang="en-US"/>
           </a:p>
@@ -10061,7 +10070,7 @@
           <a:p>
             <a:fld id="{6E4BB78C-88A4-432F-8BB5-272D432DED4B}" type="datetime1">
               <a:rPr lang="en-GB" smtClean="0"/>
-              <a:t>07/07/2025</a:t>
+              <a:t>29/07/2025</a:t>
             </a:fld>
             <a:endParaRPr lang="en-US"/>
           </a:p>
@@ -10557,7 +10566,7 @@
           <a:p>
             <a:fld id="{6E4BB78C-88A4-432F-8BB5-272D432DED4B}" type="datetime1">
               <a:rPr lang="en-GB" smtClean="0"/>
-              <a:t>07/07/2025</a:t>
+              <a:t>29/07/2025</a:t>
             </a:fld>
             <a:endParaRPr lang="en-US"/>
           </a:p>
@@ -11253,7 +11262,7 @@
           <a:p>
             <a:fld id="{6E4BB78C-88A4-432F-8BB5-272D432DED4B}" type="datetime1">
               <a:rPr lang="en-GB" smtClean="0"/>
-              <a:t>07/07/2025</a:t>
+              <a:t>29/07/2025</a:t>
             </a:fld>
             <a:endParaRPr lang="en-US"/>
           </a:p>
@@ -11860,7 +11869,7 @@
           <a:p>
             <a:fld id="{A6FFC6E5-5193-4CAC-9986-53F77D497977}" type="datetime1">
               <a:rPr lang="en-GB" smtClean="0"/>
-              <a:t>07/07/2025</a:t>
+              <a:t>29/07/2025</a:t>
             </a:fld>
             <a:endParaRPr lang="en-US"/>
           </a:p>
@@ -12068,7 +12077,7 @@
           <a:p>
             <a:fld id="{A6FFC6E5-5193-4CAC-9986-53F77D497977}" type="datetime1">
               <a:rPr lang="en-GB" smtClean="0"/>
-              <a:t>07/07/2025</a:t>
+              <a:t>29/07/2025</a:t>
             </a:fld>
             <a:endParaRPr lang="en-US"/>
           </a:p>
@@ -12338,7 +12347,7 @@
           <a:p>
             <a:fld id="{6E4BB78C-88A4-432F-8BB5-272D432DED4B}" type="datetime1">
               <a:rPr lang="en-GB" smtClean="0"/>
-              <a:t>07/07/2025</a:t>
+              <a:t>29/07/2025</a:t>
             </a:fld>
             <a:endParaRPr lang="en-US"/>
           </a:p>
@@ -12809,7 +12818,7 @@
           <a:p>
             <a:fld id="{6E4BB78C-88A4-432F-8BB5-272D432DED4B}" type="datetime1">
               <a:rPr lang="en-GB" smtClean="0"/>
-              <a:t>07/07/2025</a:t>
+              <a:t>29/07/2025</a:t>
             </a:fld>
             <a:endParaRPr lang="en-US"/>
           </a:p>
@@ -13289,7 +13298,7 @@
           <a:p>
             <a:fld id="{6E4BB78C-88A4-432F-8BB5-272D432DED4B}" type="datetime1">
               <a:rPr lang="en-GB" smtClean="0"/>
-              <a:t>07/07/2025</a:t>
+              <a:t>29/07/2025</a:t>
             </a:fld>
             <a:endParaRPr lang="en-US"/>
           </a:p>
@@ -13755,7 +13764,7 @@
           <a:p>
             <a:fld id="{6E4BB78C-88A4-432F-8BB5-272D432DED4B}" type="datetime1">
               <a:rPr lang="en-GB" smtClean="0"/>
-              <a:t>07/07/2025</a:t>
+              <a:t>29/07/2025</a:t>
             </a:fld>
             <a:endParaRPr lang="en-US"/>
           </a:p>
@@ -14408,7 +14417,7 @@
           <a:p>
             <a:fld id="{A6FFC6E5-5193-4CAC-9986-53F77D497977}" type="datetime1">
               <a:rPr lang="en-GB" smtClean="0"/>
-              <a:t>07/07/2025</a:t>
+              <a:t>29/07/2025</a:t>
             </a:fld>
             <a:endParaRPr lang="en-US"/>
           </a:p>
@@ -14733,7 +14742,7 @@
           <a:p>
             <a:fld id="{BB84F609-2801-49CC-B7D4-0277127E82D0}" type="datetime1">
               <a:rPr lang="en-GB" smtClean="0"/>
-              <a:t>07/07/2025</a:t>
+              <a:t>29/07/2025</a:t>
             </a:fld>
             <a:endParaRPr lang="en-US" dirty="0"/>
           </a:p>
@@ -14955,7 +14964,7 @@
           <a:p>
             <a:fld id="{BB84F609-2801-49CC-B7D4-0277127E82D0}" type="datetime1">
               <a:rPr lang="en-GB" smtClean="0"/>
-              <a:t>07/07/2025</a:t>
+              <a:t>29/07/2025</a:t>
             </a:fld>
             <a:endParaRPr lang="en-US" dirty="0"/>
           </a:p>
@@ -15208,7 +15217,7 @@
           <a:p>
             <a:fld id="{6E4BB78C-88A4-432F-8BB5-272D432DED4B}" type="datetime1">
               <a:rPr lang="en-GB" smtClean="0"/>
-              <a:t>07/07/2025</a:t>
+              <a:t>29/07/2025</a:t>
             </a:fld>
             <a:endParaRPr lang="en-US"/>
           </a:p>
@@ -15496,7 +15505,7 @@
           <a:p>
             <a:fld id="{6E4BB78C-88A4-432F-8BB5-272D432DED4B}" type="datetime1">
               <a:rPr lang="en-GB" smtClean="0"/>
-              <a:t>07/07/2025</a:t>
+              <a:t>29/07/2025</a:t>
             </a:fld>
             <a:endParaRPr lang="en-US"/>
           </a:p>
@@ -15737,7 +15746,7 @@
           <a:p>
             <a:fld id="{6E4BB78C-88A4-432F-8BB5-272D432DED4B}" type="datetime1">
               <a:rPr lang="en-GB" smtClean="0"/>
-              <a:t>07/07/2025</a:t>
+              <a:t>29/07/2025</a:t>
             </a:fld>
             <a:endParaRPr lang="en-US"/>
           </a:p>
@@ -15895,92 +15904,6 @@
       </p:sp>
       <p:sp>
         <p:nvSpPr>
-          <p:cNvPr id="3" name="Content Placeholder 2">
-            <a:extLst>
-              <a:ext uri="{FF2B5EF4-FFF2-40B4-BE49-F238E27FC236}">
-                <a16:creationId xmlns:a16="http://schemas.microsoft.com/office/drawing/2014/main" id="{C6FCEB95-5EDA-295D-2165-6D24C1B15C02}"/>
-              </a:ext>
-            </a:extLst>
-          </p:cNvPr>
-          <p:cNvSpPr>
-            <a:spLocks noGrp="1"/>
-          </p:cNvSpPr>
-          <p:nvPr>
-            <p:ph idx="1"/>
-          </p:nvPr>
-        </p:nvSpPr>
-        <p:spPr>
-          <a:xfrm>
-            <a:off x="1588698" y="2766218"/>
-            <a:ext cx="9014604" cy="1325563"/>
-          </a:xfrm>
-        </p:spPr>
-        <p:txBody>
-          <a:bodyPr/>
-          <a:lstStyle/>
-          <a:p>
-            <a:pPr marL="0" indent="0">
-              <a:buNone/>
-            </a:pPr>
-            <a:r>
-              <a:rPr lang="en-GB" dirty="0"/>
-              <a:t>Conduct exploratory data analysis on Q1 2025 bookings and sales data to </a:t>
-            </a:r>
-            <a:r>
-              <a:rPr lang="en-GB" b="1" spc="-150" dirty="0">
-                <a:solidFill>
-                  <a:schemeClr val="accent4">
-                    <a:lumMod val="75000"/>
-                  </a:schemeClr>
-                </a:solidFill>
-              </a:rPr>
-              <a:t>generate insights</a:t>
-            </a:r>
-            <a:r>
-              <a:rPr lang="en-GB" b="1" spc="-150" dirty="0"/>
-              <a:t> </a:t>
-            </a:r>
-            <a:r>
-              <a:rPr lang="en-GB" dirty="0"/>
-              <a:t>about </a:t>
-            </a:r>
-            <a:r>
-              <a:rPr lang="en-GB" b="1" spc="-150" dirty="0">
-                <a:solidFill>
-                  <a:srgbClr val="FF0000"/>
-                </a:solidFill>
-              </a:rPr>
-              <a:t>customer behaviour</a:t>
-            </a:r>
-            <a:r>
-              <a:rPr lang="en-GB" dirty="0">
-                <a:solidFill>
-                  <a:srgbClr val="FFC000"/>
-                </a:solidFill>
-              </a:rPr>
-              <a:t> </a:t>
-            </a:r>
-            <a:r>
-              <a:rPr lang="en-GB" dirty="0"/>
-              <a:t>and </a:t>
-            </a:r>
-            <a:r>
-              <a:rPr lang="en-GB" b="1" spc="-150" dirty="0">
-                <a:solidFill>
-                  <a:srgbClr val="FF0000"/>
-                </a:solidFill>
-              </a:rPr>
-              <a:t>sales performance</a:t>
-            </a:r>
-            <a:r>
-              <a:rPr lang="en-GB" dirty="0"/>
-              <a:t>.</a:t>
-            </a:r>
-          </a:p>
-        </p:txBody>
-      </p:sp>
-      <p:sp>
-        <p:nvSpPr>
           <p:cNvPr id="4" name="Date Placeholder 3">
             <a:extLst>
               <a:ext uri="{FF2B5EF4-FFF2-40B4-BE49-F238E27FC236}">
@@ -16002,7 +15925,7 @@
           <a:p>
             <a:fld id="{6E4BB78C-88A4-432F-8BB5-272D432DED4B}" type="datetime1">
               <a:rPr lang="en-GB" smtClean="0"/>
-              <a:t>07/07/2025</a:t>
+              <a:t>29/07/2025</a:t>
             </a:fld>
             <a:endParaRPr lang="en-US"/>
           </a:p>
@@ -16088,6 +16011,258 @@
           <a:p>
             <a:pPr algn="ctr"/>
             <a:endParaRPr lang="en-GB" dirty="0"/>
+          </a:p>
+        </p:txBody>
+      </p:sp>
+      <p:sp>
+        <p:nvSpPr>
+          <p:cNvPr id="5" name="Content Placeholder 2">
+            <a:extLst>
+              <a:ext uri="{FF2B5EF4-FFF2-40B4-BE49-F238E27FC236}">
+                <a16:creationId xmlns:a16="http://schemas.microsoft.com/office/drawing/2014/main" id="{DEBD9C6D-4798-78C1-67A5-710DB762A21A}"/>
+              </a:ext>
+            </a:extLst>
+          </p:cNvPr>
+          <p:cNvSpPr txBox="1">
+            <a:spLocks/>
+          </p:cNvSpPr>
+          <p:nvPr/>
+        </p:nvSpPr>
+        <p:spPr>
+          <a:xfrm>
+            <a:off x="1588698" y="2643749"/>
+            <a:ext cx="9120150" cy="1570502"/>
+          </a:xfrm>
+          <a:prstGeom prst="rect">
+            <a:avLst/>
+          </a:prstGeom>
+        </p:spPr>
+        <p:txBody>
+          <a:bodyPr vert="horz" lIns="91440" tIns="45720" rIns="91440" bIns="45720" rtlCol="0">
+            <a:noAutofit/>
+          </a:bodyPr>
+          <a:lstStyle>
+            <a:lvl1pPr marL="228600" indent="-228600" algn="l" defTabSz="914400" rtl="0" eaLnBrk="1" latinLnBrk="0" hangingPunct="1">
+              <a:lnSpc>
+                <a:spcPct val="90000"/>
+              </a:lnSpc>
+              <a:spcBef>
+                <a:spcPts val="1000"/>
+              </a:spcBef>
+              <a:buFont typeface="Arial" panose="020B0604020202020204" pitchFamily="34" charset="0"/>
+              <a:buChar char="•"/>
+              <a:defRPr sz="2800" kern="1200">
+                <a:solidFill>
+                  <a:schemeClr val="tx1"/>
+                </a:solidFill>
+                <a:latin typeface="+mn-lt"/>
+                <a:ea typeface="+mn-ea"/>
+                <a:cs typeface="+mn-cs"/>
+              </a:defRPr>
+            </a:lvl1pPr>
+            <a:lvl2pPr marL="685800" indent="-228600" algn="l" defTabSz="914400" rtl="0" eaLnBrk="1" latinLnBrk="0" hangingPunct="1">
+              <a:lnSpc>
+                <a:spcPct val="90000"/>
+              </a:lnSpc>
+              <a:spcBef>
+                <a:spcPts val="500"/>
+              </a:spcBef>
+              <a:buFont typeface="Arial" panose="020B0604020202020204" pitchFamily="34" charset="0"/>
+              <a:buChar char="•"/>
+              <a:defRPr sz="2400" kern="1200">
+                <a:solidFill>
+                  <a:schemeClr val="tx1"/>
+                </a:solidFill>
+                <a:latin typeface="+mn-lt"/>
+                <a:ea typeface="+mn-ea"/>
+                <a:cs typeface="+mn-cs"/>
+              </a:defRPr>
+            </a:lvl2pPr>
+            <a:lvl3pPr marL="1143000" indent="-228600" algn="l" defTabSz="914400" rtl="0" eaLnBrk="1" latinLnBrk="0" hangingPunct="1">
+              <a:lnSpc>
+                <a:spcPct val="90000"/>
+              </a:lnSpc>
+              <a:spcBef>
+                <a:spcPts val="500"/>
+              </a:spcBef>
+              <a:buFont typeface="Arial" panose="020B0604020202020204" pitchFamily="34" charset="0"/>
+              <a:buChar char="•"/>
+              <a:defRPr sz="2000" kern="1200">
+                <a:solidFill>
+                  <a:schemeClr val="tx1"/>
+                </a:solidFill>
+                <a:latin typeface="+mn-lt"/>
+                <a:ea typeface="+mn-ea"/>
+                <a:cs typeface="+mn-cs"/>
+              </a:defRPr>
+            </a:lvl3pPr>
+            <a:lvl4pPr marL="1600200" indent="-228600" algn="l" defTabSz="914400" rtl="0" eaLnBrk="1" latinLnBrk="0" hangingPunct="1">
+              <a:lnSpc>
+                <a:spcPct val="90000"/>
+              </a:lnSpc>
+              <a:spcBef>
+                <a:spcPts val="500"/>
+              </a:spcBef>
+              <a:buFont typeface="Arial" panose="020B0604020202020204" pitchFamily="34" charset="0"/>
+              <a:buChar char="•"/>
+              <a:defRPr sz="1800" kern="1200">
+                <a:solidFill>
+                  <a:schemeClr val="tx1"/>
+                </a:solidFill>
+                <a:latin typeface="+mn-lt"/>
+                <a:ea typeface="+mn-ea"/>
+                <a:cs typeface="+mn-cs"/>
+              </a:defRPr>
+            </a:lvl4pPr>
+            <a:lvl5pPr marL="2057400" indent="-228600" algn="l" defTabSz="914400" rtl="0" eaLnBrk="1" latinLnBrk="0" hangingPunct="1">
+              <a:lnSpc>
+                <a:spcPct val="90000"/>
+              </a:lnSpc>
+              <a:spcBef>
+                <a:spcPts val="500"/>
+              </a:spcBef>
+              <a:buFont typeface="Arial" panose="020B0604020202020204" pitchFamily="34" charset="0"/>
+              <a:buChar char="•"/>
+              <a:defRPr sz="1800" kern="1200">
+                <a:solidFill>
+                  <a:schemeClr val="tx1"/>
+                </a:solidFill>
+                <a:latin typeface="+mn-lt"/>
+                <a:ea typeface="+mn-ea"/>
+                <a:cs typeface="+mn-cs"/>
+              </a:defRPr>
+            </a:lvl5pPr>
+            <a:lvl6pPr marL="2514600" indent="-228600" algn="l" defTabSz="914400" rtl="0" eaLnBrk="1" latinLnBrk="0" hangingPunct="1">
+              <a:lnSpc>
+                <a:spcPct val="90000"/>
+              </a:lnSpc>
+              <a:spcBef>
+                <a:spcPts val="500"/>
+              </a:spcBef>
+              <a:buFont typeface="Arial" panose="020B0604020202020204" pitchFamily="34" charset="0"/>
+              <a:buChar char="•"/>
+              <a:defRPr sz="1800" kern="1200">
+                <a:solidFill>
+                  <a:schemeClr val="tx1"/>
+                </a:solidFill>
+                <a:latin typeface="+mn-lt"/>
+                <a:ea typeface="+mn-ea"/>
+                <a:cs typeface="+mn-cs"/>
+              </a:defRPr>
+            </a:lvl6pPr>
+            <a:lvl7pPr marL="2971800" indent="-228600" algn="l" defTabSz="914400" rtl="0" eaLnBrk="1" latinLnBrk="0" hangingPunct="1">
+              <a:lnSpc>
+                <a:spcPct val="90000"/>
+              </a:lnSpc>
+              <a:spcBef>
+                <a:spcPts val="500"/>
+              </a:spcBef>
+              <a:buFont typeface="Arial" panose="020B0604020202020204" pitchFamily="34" charset="0"/>
+              <a:buChar char="•"/>
+              <a:defRPr sz="1800" kern="1200">
+                <a:solidFill>
+                  <a:schemeClr val="tx1"/>
+                </a:solidFill>
+                <a:latin typeface="+mn-lt"/>
+                <a:ea typeface="+mn-ea"/>
+                <a:cs typeface="+mn-cs"/>
+              </a:defRPr>
+            </a:lvl7pPr>
+            <a:lvl8pPr marL="3429000" indent="-228600" algn="l" defTabSz="914400" rtl="0" eaLnBrk="1" latinLnBrk="0" hangingPunct="1">
+              <a:lnSpc>
+                <a:spcPct val="90000"/>
+              </a:lnSpc>
+              <a:spcBef>
+                <a:spcPts val="500"/>
+              </a:spcBef>
+              <a:buFont typeface="Arial" panose="020B0604020202020204" pitchFamily="34" charset="0"/>
+              <a:buChar char="•"/>
+              <a:defRPr sz="1800" kern="1200">
+                <a:solidFill>
+                  <a:schemeClr val="tx1"/>
+                </a:solidFill>
+                <a:latin typeface="+mn-lt"/>
+                <a:ea typeface="+mn-ea"/>
+                <a:cs typeface="+mn-cs"/>
+              </a:defRPr>
+            </a:lvl8pPr>
+            <a:lvl9pPr marL="3886200" indent="-228600" algn="l" defTabSz="914400" rtl="0" eaLnBrk="1" latinLnBrk="0" hangingPunct="1">
+              <a:lnSpc>
+                <a:spcPct val="90000"/>
+              </a:lnSpc>
+              <a:spcBef>
+                <a:spcPts val="500"/>
+              </a:spcBef>
+              <a:buFont typeface="Arial" panose="020B0604020202020204" pitchFamily="34" charset="0"/>
+              <a:buChar char="•"/>
+              <a:defRPr sz="1800" kern="1200">
+                <a:solidFill>
+                  <a:schemeClr val="tx1"/>
+                </a:solidFill>
+                <a:latin typeface="+mn-lt"/>
+                <a:ea typeface="+mn-ea"/>
+                <a:cs typeface="+mn-cs"/>
+              </a:defRPr>
+            </a:lvl9pPr>
+          </a:lstStyle>
+          <a:p>
+            <a:pPr marL="0" indent="0">
+              <a:buNone/>
+            </a:pPr>
+            <a:r>
+              <a:rPr lang="en-GB" dirty="0"/>
+              <a:t>Conduct exploratory data analysis on Q1 2025 bookings and sales data to </a:t>
+            </a:r>
+            <a:r>
+              <a:rPr lang="en-GB" b="1" spc="-150" dirty="0">
+                <a:solidFill>
+                  <a:schemeClr val="accent4">
+                    <a:lumMod val="75000"/>
+                  </a:schemeClr>
+                </a:solidFill>
+              </a:rPr>
+              <a:t>generate insights</a:t>
+            </a:r>
+            <a:r>
+              <a:rPr lang="en-GB" b="1" spc="-150" dirty="0"/>
+              <a:t> </a:t>
+            </a:r>
+            <a:r>
+              <a:rPr lang="en-GB" dirty="0"/>
+              <a:t>about </a:t>
+            </a:r>
+            <a:r>
+              <a:rPr lang="en-GB" b="1" spc="-150" dirty="0">
+                <a:solidFill>
+                  <a:srgbClr val="FF0000"/>
+                </a:solidFill>
+              </a:rPr>
+              <a:t>customer behaviour</a:t>
+            </a:r>
+            <a:r>
+              <a:rPr lang="en-GB" dirty="0">
+                <a:solidFill>
+                  <a:srgbClr val="FFC000"/>
+                </a:solidFill>
+              </a:rPr>
+              <a:t> </a:t>
+            </a:r>
+            <a:r>
+              <a:rPr lang="en-GB" dirty="0"/>
+              <a:t>and </a:t>
+            </a:r>
+            <a:r>
+              <a:rPr lang="en-GB" b="1" spc="-150" dirty="0">
+                <a:solidFill>
+                  <a:srgbClr val="FF0000"/>
+                </a:solidFill>
+              </a:rPr>
+              <a:t>sales performance</a:t>
+            </a:r>
+            <a:r>
+              <a:rPr lang="en-GB" dirty="0"/>
+              <a:t>.</a:t>
+            </a:r>
           </a:p>
         </p:txBody>
       </p:sp>
@@ -16246,7 +16421,7 @@
           <a:p>
             <a:fld id="{6E4BB78C-88A4-432F-8BB5-272D432DED4B}" type="datetime1">
               <a:rPr lang="en-GB" smtClean="0"/>
-              <a:t>07/07/2025</a:t>
+              <a:t>29/07/2025</a:t>
             </a:fld>
             <a:endParaRPr lang="en-US"/>
           </a:p>
@@ -16394,7 +16569,7 @@
           <a:p>
             <a:fld id="{A6FFC6E5-5193-4CAC-9986-53F77D497977}" type="datetime1">
               <a:rPr lang="en-GB" smtClean="0"/>
-              <a:t>07/07/2025</a:t>
+              <a:t>29/07/2025</a:t>
             </a:fld>
             <a:endParaRPr lang="en-US"/>
           </a:p>
@@ -16641,7 +16816,7 @@
           <a:p>
             <a:fld id="{6E4BB78C-88A4-432F-8BB5-272D432DED4B}" type="datetime1">
               <a:rPr lang="en-GB" smtClean="0"/>
-              <a:t>07/07/2025</a:t>
+              <a:t>29/07/2025</a:t>
             </a:fld>
             <a:endParaRPr lang="en-US"/>
           </a:p>
@@ -16925,28 +17100,13 @@
             <a:pPr marL="0" indent="0">
               <a:buNone/>
             </a:pPr>
-            <a:r>
-              <a:rPr lang="en-GB" dirty="0"/>
-              <a:t>I am looking for a </a:t>
-            </a:r>
-            <a:r>
-              <a:rPr lang="en-GB" b="1" spc="-150" dirty="0"/>
-              <a:t>Data Analyst Apprenticeship</a:t>
-            </a:r>
-            <a:endParaRPr lang="en-GB" spc="-150" dirty="0"/>
+            <a:endParaRPr lang="en-GB" dirty="0"/>
           </a:p>
           <a:p>
             <a:pPr marL="0" indent="0">
               <a:buNone/>
             </a:pPr>
-            <a:r>
-              <a:rPr lang="en-GB" dirty="0"/>
-              <a:t>or a </a:t>
-            </a:r>
-            <a:r>
-              <a:rPr lang="en-GB" b="1" spc="-150" dirty="0"/>
-              <a:t>Junior / Entry-level Data Analyst role</a:t>
-            </a:r>
+            <a:endParaRPr lang="en-GB" dirty="0"/>
           </a:p>
           <a:p>
             <a:pPr marL="0" indent="0">
@@ -17194,7 +17354,7 @@
           <a:p>
             <a:fld id="{6E4BB78C-88A4-432F-8BB5-272D432DED4B}" type="datetime1">
               <a:rPr lang="en-GB" smtClean="0"/>
-              <a:t>07/07/2025</a:t>
+              <a:t>29/07/2025</a:t>
             </a:fld>
             <a:endParaRPr lang="en-US"/>
           </a:p>
@@ -17453,7 +17613,7 @@
           <a:p>
             <a:fld id="{6E4BB78C-88A4-432F-8BB5-272D432DED4B}" type="datetime1">
               <a:rPr lang="en-GB" smtClean="0"/>
-              <a:t>07/07/2025</a:t>
+              <a:t>29/07/2025</a:t>
             </a:fld>
             <a:endParaRPr lang="en-US"/>
           </a:p>
@@ -17601,7 +17761,7 @@
           <a:p>
             <a:fld id="{A6FFC6E5-5193-4CAC-9986-53F77D497977}" type="datetime1">
               <a:rPr lang="en-GB" smtClean="0"/>
-              <a:t>07/07/2025</a:t>
+              <a:t>29/07/2025</a:t>
             </a:fld>
             <a:endParaRPr lang="en-US"/>
           </a:p>
@@ -17981,7 +18141,7 @@
           <a:p>
             <a:fld id="{6E4BB78C-88A4-432F-8BB5-272D432DED4B}" type="datetime1">
               <a:rPr lang="en-GB" smtClean="0"/>
-              <a:t>07/07/2025</a:t>
+              <a:t>29/07/2025</a:t>
             </a:fld>
             <a:endParaRPr lang="en-US"/>
           </a:p>
@@ -18319,7 +18479,7 @@
           <a:p>
             <a:fld id="{6E4BB78C-88A4-432F-8BB5-272D432DED4B}" type="datetime1">
               <a:rPr lang="en-GB" smtClean="0"/>
-              <a:t>07/07/2025</a:t>
+              <a:t>29/07/2025</a:t>
             </a:fld>
             <a:endParaRPr lang="en-US"/>
           </a:p>
@@ -18504,7 +18664,7 @@
           <a:p>
             <a:fld id="{6E4BB78C-88A4-432F-8BB5-272D432DED4B}" type="datetime1">
               <a:rPr lang="en-GB" smtClean="0"/>
-              <a:t>07/07/2025</a:t>
+              <a:t>29/07/2025</a:t>
             </a:fld>
             <a:endParaRPr lang="en-US"/>
           </a:p>
@@ -20165,21 +20325,21 @@
 </file>
 
 <file path=customXml/item1.xml><?xml version="1.0" encoding="utf-8"?>
+<p:properties xmlns:p="http://schemas.microsoft.com/office/2006/metadata/properties" xmlns:xsi="http://www.w3.org/2001/XMLSchema-instance" xmlns:pc="http://schemas.microsoft.com/office/infopath/2007/PartnerControls">
+  <documentManagement>
+    <Document_x0020_Purpose xmlns="f577acbf-5b0b-4b4f-9948-268e97f8d3a4">Informational</Document_x0020_Purpose>
+    <Initiatives xmlns="f577acbf-5b0b-4b4f-9948-268e97f8d3a4"/>
+  </documentManagement>
+</p:properties>
+</file>
+
+<file path=customXml/item2.xml><?xml version="1.0" encoding="utf-8"?>
 <?mso-contentType ?>
 <FormTemplates xmlns="http://schemas.microsoft.com/sharepoint/v3/contenttype/forms">
   <Display>DocumentLibraryForm</Display>
   <Edit>DocumentLibraryForm</Edit>
   <New>DocumentLibraryForm</New>
 </FormTemplates>
-</file>
-
-<file path=customXml/item2.xml><?xml version="1.0" encoding="utf-8"?>
-<p:properties xmlns:p="http://schemas.microsoft.com/office/2006/metadata/properties" xmlns:xsi="http://www.w3.org/2001/XMLSchema-instance" xmlns:pc="http://schemas.microsoft.com/office/infopath/2007/PartnerControls">
-  <documentManagement>
-    <Document_x0020_Purpose xmlns="f577acbf-5b0b-4b4f-9948-268e97f8d3a4">Informational</Document_x0020_Purpose>
-    <Initiatives xmlns="f577acbf-5b0b-4b4f-9948-268e97f8d3a4"/>
-  </documentManagement>
-</p:properties>
 </file>
 
 <file path=customXml/item3.xml><?xml version="1.0" encoding="utf-8"?>
@@ -20439,14 +20599,6 @@
 </file>
 
 <file path=customXml/itemProps1.xml><?xml version="1.0" encoding="utf-8"?>
-<ds:datastoreItem xmlns:ds="http://schemas.openxmlformats.org/officeDocument/2006/customXml" ds:itemID="{E21AFCC0-734A-4A90-A597-A1CB34860DCD}">
-  <ds:schemaRefs>
-    <ds:schemaRef ds:uri="http://schemas.microsoft.com/sharepoint/v3/contenttype/forms"/>
-  </ds:schemaRefs>
-</ds:datastoreItem>
-</file>
-
-<file path=customXml/itemProps2.xml><?xml version="1.0" encoding="utf-8"?>
 <ds:datastoreItem xmlns:ds="http://schemas.openxmlformats.org/officeDocument/2006/customXml" ds:itemID="{617AB1FA-2F28-4684-9230-02ACEB6C0B0A}">
   <ds:schemaRefs>
     <ds:schemaRef ds:uri="http://purl.org/dc/elements/1.1/"/>
@@ -20459,6 +20611,14 @@
     <ds:schemaRef ds:uri="http://purl.org/dc/dcmitype/"/>
     <ds:schemaRef ds:uri="http://schemas.microsoft.com/office/infopath/2007/PartnerControls"/>
     <ds:schemaRef ds:uri="http://www.w3.org/XML/1998/namespace"/>
+  </ds:schemaRefs>
+</ds:datastoreItem>
+</file>
+
+<file path=customXml/itemProps2.xml><?xml version="1.0" encoding="utf-8"?>
+<ds:datastoreItem xmlns:ds="http://schemas.openxmlformats.org/officeDocument/2006/customXml" ds:itemID="{E21AFCC0-734A-4A90-A597-A1CB34860DCD}">
+  <ds:schemaRefs>
+    <ds:schemaRef ds:uri="http://schemas.microsoft.com/sharepoint/v3/contenttype/forms"/>
   </ds:schemaRefs>
 </ds:datastoreItem>
 </file>

</xml_diff>